<commit_message>
Update case_holes adding LCD and Buttons
</commit_message>
<xml_diff>
--- a/case_holes.pptx
+++ b/case_holes.pptx
@@ -259,7 +259,7 @@
           <a:p>
             <a:fld id="{E382E565-AA90-4AB1-82FE-F852C09546E5}" type="datetimeFigureOut">
               <a:rPr lang="it-IT" smtClean="0"/>
-              <a:t>19/04/2020</a:t>
+              <a:t>01/05/2020</a:t>
             </a:fld>
             <a:endParaRPr lang="it-IT"/>
           </a:p>
@@ -457,7 +457,7 @@
           <a:p>
             <a:fld id="{E382E565-AA90-4AB1-82FE-F852C09546E5}" type="datetimeFigureOut">
               <a:rPr lang="it-IT" smtClean="0"/>
-              <a:t>19/04/2020</a:t>
+              <a:t>01/05/2020</a:t>
             </a:fld>
             <a:endParaRPr lang="it-IT"/>
           </a:p>
@@ -665,7 +665,7 @@
           <a:p>
             <a:fld id="{E382E565-AA90-4AB1-82FE-F852C09546E5}" type="datetimeFigureOut">
               <a:rPr lang="it-IT" smtClean="0"/>
-              <a:t>19/04/2020</a:t>
+              <a:t>01/05/2020</a:t>
             </a:fld>
             <a:endParaRPr lang="it-IT"/>
           </a:p>
@@ -863,7 +863,7 @@
           <a:p>
             <a:fld id="{E382E565-AA90-4AB1-82FE-F852C09546E5}" type="datetimeFigureOut">
               <a:rPr lang="it-IT" smtClean="0"/>
-              <a:t>19/04/2020</a:t>
+              <a:t>01/05/2020</a:t>
             </a:fld>
             <a:endParaRPr lang="it-IT"/>
           </a:p>
@@ -1138,7 +1138,7 @@
           <a:p>
             <a:fld id="{E382E565-AA90-4AB1-82FE-F852C09546E5}" type="datetimeFigureOut">
               <a:rPr lang="it-IT" smtClean="0"/>
-              <a:t>19/04/2020</a:t>
+              <a:t>01/05/2020</a:t>
             </a:fld>
             <a:endParaRPr lang="it-IT"/>
           </a:p>
@@ -1403,7 +1403,7 @@
           <a:p>
             <a:fld id="{E382E565-AA90-4AB1-82FE-F852C09546E5}" type="datetimeFigureOut">
               <a:rPr lang="it-IT" smtClean="0"/>
-              <a:t>19/04/2020</a:t>
+              <a:t>01/05/2020</a:t>
             </a:fld>
             <a:endParaRPr lang="it-IT"/>
           </a:p>
@@ -1815,7 +1815,7 @@
           <a:p>
             <a:fld id="{E382E565-AA90-4AB1-82FE-F852C09546E5}" type="datetimeFigureOut">
               <a:rPr lang="it-IT" smtClean="0"/>
-              <a:t>19/04/2020</a:t>
+              <a:t>01/05/2020</a:t>
             </a:fld>
             <a:endParaRPr lang="it-IT"/>
           </a:p>
@@ -1956,7 +1956,7 @@
           <a:p>
             <a:fld id="{E382E565-AA90-4AB1-82FE-F852C09546E5}" type="datetimeFigureOut">
               <a:rPr lang="it-IT" smtClean="0"/>
-              <a:t>19/04/2020</a:t>
+              <a:t>01/05/2020</a:t>
             </a:fld>
             <a:endParaRPr lang="it-IT"/>
           </a:p>
@@ -2069,7 +2069,7 @@
           <a:p>
             <a:fld id="{E382E565-AA90-4AB1-82FE-F852C09546E5}" type="datetimeFigureOut">
               <a:rPr lang="it-IT" smtClean="0"/>
-              <a:t>19/04/2020</a:t>
+              <a:t>01/05/2020</a:t>
             </a:fld>
             <a:endParaRPr lang="it-IT"/>
           </a:p>
@@ -2380,7 +2380,7 @@
           <a:p>
             <a:fld id="{E382E565-AA90-4AB1-82FE-F852C09546E5}" type="datetimeFigureOut">
               <a:rPr lang="it-IT" smtClean="0"/>
-              <a:t>19/04/2020</a:t>
+              <a:t>01/05/2020</a:t>
             </a:fld>
             <a:endParaRPr lang="it-IT"/>
           </a:p>
@@ -2668,7 +2668,7 @@
           <a:p>
             <a:fld id="{E382E565-AA90-4AB1-82FE-F852C09546E5}" type="datetimeFigureOut">
               <a:rPr lang="it-IT" smtClean="0"/>
-              <a:t>19/04/2020</a:t>
+              <a:t>01/05/2020</a:t>
             </a:fld>
             <a:endParaRPr lang="it-IT"/>
           </a:p>
@@ -2909,7 +2909,7 @@
           <a:p>
             <a:fld id="{E382E565-AA90-4AB1-82FE-F852C09546E5}" type="datetimeFigureOut">
               <a:rPr lang="it-IT" smtClean="0"/>
-              <a:t>19/04/2020</a:t>
+              <a:t>01/05/2020</a:t>
             </a:fld>
             <a:endParaRPr lang="it-IT"/>
           </a:p>
@@ -3328,10 +3328,10 @@
       </p:grpSpPr>
       <p:sp>
         <p:nvSpPr>
-          <p:cNvPr id="19" name="Rettangolo 18">
-            <a:extLst>
-              <a:ext uri="{FF2B5EF4-FFF2-40B4-BE49-F238E27FC236}">
-                <a16:creationId xmlns:a16="http://schemas.microsoft.com/office/drawing/2014/main" id="{1870EEA9-5A84-4E90-B484-BF585FE9ACE7}"/>
+          <p:cNvPr id="16" name="Rettangolo 15">
+            <a:extLst>
+              <a:ext uri="{FF2B5EF4-FFF2-40B4-BE49-F238E27FC236}">
+                <a16:creationId xmlns:a16="http://schemas.microsoft.com/office/drawing/2014/main" id="{D9118E10-7ACF-4D96-9D78-001177F906CC}"/>
               </a:ext>
             </a:extLst>
           </p:cNvPr>
@@ -3340,7 +3340,7 @@
         </p:nvSpPr>
         <p:spPr>
           <a:xfrm rot="5400000">
-            <a:off x="6076200" y="-67574"/>
+            <a:off x="1672126" y="2878740"/>
             <a:ext cx="972000" cy="1692000"/>
           </a:xfrm>
           <a:prstGeom prst="rect">
@@ -3376,10 +3376,10 @@
       </p:sp>
       <p:cxnSp>
         <p:nvCxnSpPr>
-          <p:cNvPr id="20" name="Connettore diritto 19">
-            <a:extLst>
-              <a:ext uri="{FF2B5EF4-FFF2-40B4-BE49-F238E27FC236}">
-                <a16:creationId xmlns:a16="http://schemas.microsoft.com/office/drawing/2014/main" id="{28846741-C5B8-43DE-A8B4-2B046E3476A1}"/>
+          <p:cNvPr id="17" name="Connettore diritto 16">
+            <a:extLst>
+              <a:ext uri="{FF2B5EF4-FFF2-40B4-BE49-F238E27FC236}">
+                <a16:creationId xmlns:a16="http://schemas.microsoft.com/office/drawing/2014/main" id="{AB437B1F-2D41-4134-88D1-B338068537CD}"/>
               </a:ext>
             </a:extLst>
           </p:cNvPr>
@@ -3390,245 +3390,7 @@
         </p:nvCxnSpPr>
         <p:spPr>
           <a:xfrm>
-            <a:off x="7409700" y="507986"/>
-            <a:ext cx="0" cy="540000"/>
-          </a:xfrm>
-          <a:prstGeom prst="line">
-            <a:avLst/>
-          </a:prstGeom>
-        </p:spPr>
-        <p:style>
-          <a:lnRef idx="1">
-            <a:schemeClr val="accent1"/>
-          </a:lnRef>
-          <a:fillRef idx="0">
-            <a:schemeClr val="accent1"/>
-          </a:fillRef>
-          <a:effectRef idx="0">
-            <a:schemeClr val="accent1"/>
-          </a:effectRef>
-          <a:fontRef idx="minor">
-            <a:schemeClr val="tx1"/>
-          </a:fontRef>
-        </p:style>
-      </p:cxnSp>
-      <p:cxnSp>
-        <p:nvCxnSpPr>
-          <p:cNvPr id="21" name="Connettore diritto 20">
-            <a:extLst>
-              <a:ext uri="{FF2B5EF4-FFF2-40B4-BE49-F238E27FC236}">
-                <a16:creationId xmlns:a16="http://schemas.microsoft.com/office/drawing/2014/main" id="{EC3355C7-11BF-4A36-A8E7-BDBBF6855821}"/>
-              </a:ext>
-            </a:extLst>
-          </p:cNvPr>
-          <p:cNvCxnSpPr>
-            <a:cxnSpLocks/>
-          </p:cNvCxnSpPr>
-          <p:nvPr/>
-        </p:nvCxnSpPr>
-        <p:spPr>
-          <a:xfrm>
-            <a:off x="5716200" y="292426"/>
-            <a:ext cx="1440000" cy="0"/>
-          </a:xfrm>
-          <a:prstGeom prst="line">
-            <a:avLst/>
-          </a:prstGeom>
-        </p:spPr>
-        <p:style>
-          <a:lnRef idx="1">
-            <a:schemeClr val="accent1"/>
-          </a:lnRef>
-          <a:fillRef idx="0">
-            <a:schemeClr val="accent1"/>
-          </a:fillRef>
-          <a:effectRef idx="0">
-            <a:schemeClr val="accent1"/>
-          </a:effectRef>
-          <a:fontRef idx="minor">
-            <a:schemeClr val="tx1"/>
-          </a:fontRef>
-        </p:style>
-      </p:cxnSp>
-      <p:cxnSp>
-        <p:nvCxnSpPr>
-          <p:cNvPr id="22" name="Connettore diritto 21">
-            <a:extLst>
-              <a:ext uri="{FF2B5EF4-FFF2-40B4-BE49-F238E27FC236}">
-                <a16:creationId xmlns:a16="http://schemas.microsoft.com/office/drawing/2014/main" id="{B6A021DA-93CD-484A-8384-38A06933B945}"/>
-              </a:ext>
-            </a:extLst>
-          </p:cNvPr>
-          <p:cNvCxnSpPr>
-            <a:cxnSpLocks/>
-          </p:cNvCxnSpPr>
-          <p:nvPr/>
-        </p:nvCxnSpPr>
-        <p:spPr>
-          <a:xfrm>
-            <a:off x="7156200" y="292426"/>
-            <a:ext cx="251250" cy="215560"/>
-          </a:xfrm>
-          <a:prstGeom prst="line">
-            <a:avLst/>
-          </a:prstGeom>
-        </p:spPr>
-        <p:style>
-          <a:lnRef idx="1">
-            <a:schemeClr val="accent1"/>
-          </a:lnRef>
-          <a:fillRef idx="0">
-            <a:schemeClr val="accent1"/>
-          </a:fillRef>
-          <a:effectRef idx="0">
-            <a:schemeClr val="accent1"/>
-          </a:effectRef>
-          <a:fontRef idx="minor">
-            <a:schemeClr val="tx1"/>
-          </a:fontRef>
-        </p:style>
-      </p:cxnSp>
-      <p:cxnSp>
-        <p:nvCxnSpPr>
-          <p:cNvPr id="23" name="Connettore diritto 22">
-            <a:extLst>
-              <a:ext uri="{FF2B5EF4-FFF2-40B4-BE49-F238E27FC236}">
-                <a16:creationId xmlns:a16="http://schemas.microsoft.com/office/drawing/2014/main" id="{5D17B35A-EBF1-4459-BA6A-73AB03E8F4DD}"/>
-              </a:ext>
-            </a:extLst>
-          </p:cNvPr>
-          <p:cNvCxnSpPr>
-            <a:cxnSpLocks/>
-          </p:cNvCxnSpPr>
-          <p:nvPr/>
-        </p:nvCxnSpPr>
-        <p:spPr>
-          <a:xfrm>
-            <a:off x="5716200" y="1264426"/>
-            <a:ext cx="1440000" cy="0"/>
-          </a:xfrm>
-          <a:prstGeom prst="line">
-            <a:avLst/>
-          </a:prstGeom>
-        </p:spPr>
-        <p:style>
-          <a:lnRef idx="1">
-            <a:schemeClr val="accent1"/>
-          </a:lnRef>
-          <a:fillRef idx="0">
-            <a:schemeClr val="accent1"/>
-          </a:fillRef>
-          <a:effectRef idx="0">
-            <a:schemeClr val="accent1"/>
-          </a:effectRef>
-          <a:fontRef idx="minor">
-            <a:schemeClr val="tx1"/>
-          </a:fontRef>
-        </p:style>
-      </p:cxnSp>
-      <p:cxnSp>
-        <p:nvCxnSpPr>
-          <p:cNvPr id="24" name="Connettore diritto 23">
-            <a:extLst>
-              <a:ext uri="{FF2B5EF4-FFF2-40B4-BE49-F238E27FC236}">
-                <a16:creationId xmlns:a16="http://schemas.microsoft.com/office/drawing/2014/main" id="{1FBC6573-BF3D-49A9-9728-FC5C586E6F57}"/>
-              </a:ext>
-            </a:extLst>
-          </p:cNvPr>
-          <p:cNvCxnSpPr>
-            <a:cxnSpLocks/>
-          </p:cNvCxnSpPr>
-          <p:nvPr/>
-        </p:nvCxnSpPr>
-        <p:spPr>
-          <a:xfrm flipV="1">
-            <a:off x="7154700" y="1047986"/>
-            <a:ext cx="252750" cy="216440"/>
-          </a:xfrm>
-          <a:prstGeom prst="line">
-            <a:avLst/>
-          </a:prstGeom>
-        </p:spPr>
-        <p:style>
-          <a:lnRef idx="1">
-            <a:schemeClr val="accent1"/>
-          </a:lnRef>
-          <a:fillRef idx="0">
-            <a:schemeClr val="accent1"/>
-          </a:fillRef>
-          <a:effectRef idx="0">
-            <a:schemeClr val="accent1"/>
-          </a:effectRef>
-          <a:fontRef idx="minor">
-            <a:schemeClr val="tx1"/>
-          </a:fontRef>
-        </p:style>
-      </p:cxnSp>
-      <p:sp>
-        <p:nvSpPr>
-          <p:cNvPr id="16" name="Rettangolo 15">
-            <a:extLst>
-              <a:ext uri="{FF2B5EF4-FFF2-40B4-BE49-F238E27FC236}">
-                <a16:creationId xmlns:a16="http://schemas.microsoft.com/office/drawing/2014/main" id="{D9118E10-7ACF-4D96-9D78-001177F906CC}"/>
-              </a:ext>
-            </a:extLst>
-          </p:cNvPr>
-          <p:cNvSpPr/>
-          <p:nvPr/>
-        </p:nvSpPr>
-        <p:spPr>
-          <a:xfrm rot="5400000">
-            <a:off x="6075450" y="1525006"/>
-            <a:ext cx="972000" cy="1692000"/>
-          </a:xfrm>
-          <a:prstGeom prst="rect">
-            <a:avLst/>
-          </a:prstGeom>
-          <a:noFill/>
-          <a:ln w="25400"/>
-        </p:spPr>
-        <p:style>
-          <a:lnRef idx="2">
-            <a:schemeClr val="accent1">
-              <a:shade val="50000"/>
-            </a:schemeClr>
-          </a:lnRef>
-          <a:fillRef idx="1">
-            <a:schemeClr val="accent1"/>
-          </a:fillRef>
-          <a:effectRef idx="0">
-            <a:schemeClr val="accent1"/>
-          </a:effectRef>
-          <a:fontRef idx="minor">
-            <a:schemeClr val="lt1"/>
-          </a:fontRef>
-        </p:style>
-        <p:txBody>
-          <a:bodyPr rtlCol="0" anchor="ctr"/>
-          <a:lstStyle/>
-          <a:p>
-            <a:pPr algn="ctr"/>
-            <a:endParaRPr lang="it-IT"/>
-          </a:p>
-        </p:txBody>
-      </p:sp>
-      <p:cxnSp>
-        <p:nvCxnSpPr>
-          <p:cNvPr id="17" name="Connettore diritto 16">
-            <a:extLst>
-              <a:ext uri="{FF2B5EF4-FFF2-40B4-BE49-F238E27FC236}">
-                <a16:creationId xmlns:a16="http://schemas.microsoft.com/office/drawing/2014/main" id="{AB437B1F-2D41-4134-88D1-B338068537CD}"/>
-              </a:ext>
-            </a:extLst>
-          </p:cNvPr>
-          <p:cNvCxnSpPr>
-            <a:cxnSpLocks/>
-          </p:cNvCxnSpPr>
-          <p:nvPr/>
-        </p:nvCxnSpPr>
-        <p:spPr>
-          <a:xfrm>
-            <a:off x="7408950" y="2100566"/>
+            <a:off x="3005626" y="3454300"/>
             <a:ext cx="0" cy="540000"/>
           </a:xfrm>
           <a:prstGeom prst="line">
@@ -3666,7 +3428,7 @@
         </p:nvCxnSpPr>
         <p:spPr>
           <a:xfrm>
-            <a:off x="5715450" y="1885006"/>
+            <a:off x="1312126" y="3238740"/>
             <a:ext cx="1440000" cy="0"/>
           </a:xfrm>
           <a:prstGeom prst="line">
@@ -3704,7 +3466,7 @@
         </p:nvCxnSpPr>
         <p:spPr>
           <a:xfrm>
-            <a:off x="7155450" y="1885006"/>
+            <a:off x="2752126" y="3238740"/>
             <a:ext cx="251250" cy="215560"/>
           </a:xfrm>
           <a:prstGeom prst="line">
@@ -3742,7 +3504,7 @@
         </p:nvCxnSpPr>
         <p:spPr>
           <a:xfrm>
-            <a:off x="5715450" y="2857006"/>
+            <a:off x="1312126" y="4210740"/>
             <a:ext cx="1440000" cy="0"/>
           </a:xfrm>
           <a:prstGeom prst="line">
@@ -3780,7 +3542,7 @@
         </p:nvCxnSpPr>
         <p:spPr>
           <a:xfrm flipV="1">
-            <a:off x="7153950" y="2640566"/>
+            <a:off x="2750626" y="3994300"/>
             <a:ext cx="252750" cy="216440"/>
           </a:xfrm>
           <a:prstGeom prst="line">
@@ -4153,6 +3915,601 @@
           </a:p>
         </p:txBody>
       </p:sp>
+      <p:sp>
+        <p:nvSpPr>
+          <p:cNvPr id="2" name="CasellaDiTesto 1">
+            <a:extLst>
+              <a:ext uri="{FF2B5EF4-FFF2-40B4-BE49-F238E27FC236}">
+                <a16:creationId xmlns:a16="http://schemas.microsoft.com/office/drawing/2014/main" id="{E18FAD27-692C-4F46-8D17-1C752460D4F7}"/>
+              </a:ext>
+            </a:extLst>
+          </p:cNvPr>
+          <p:cNvSpPr txBox="1"/>
+          <p:nvPr/>
+        </p:nvSpPr>
+        <p:spPr>
+          <a:xfrm>
+            <a:off x="1692676" y="2761188"/>
+            <a:ext cx="800284" cy="369332"/>
+          </a:xfrm>
+          <a:prstGeom prst="rect">
+            <a:avLst/>
+          </a:prstGeom>
+          <a:noFill/>
+        </p:spPr>
+        <p:txBody>
+          <a:bodyPr wrap="none" rtlCol="0">
+            <a:spAutoFit/>
+          </a:bodyPr>
+          <a:lstStyle/>
+          <a:p>
+            <a:r>
+              <a:rPr lang="it-IT" dirty="0"/>
+              <a:t>Switch</a:t>
+            </a:r>
+          </a:p>
+        </p:txBody>
+      </p:sp>
+      <p:sp>
+        <p:nvSpPr>
+          <p:cNvPr id="3" name="CasellaDiTesto 2">
+            <a:extLst>
+              <a:ext uri="{FF2B5EF4-FFF2-40B4-BE49-F238E27FC236}">
+                <a16:creationId xmlns:a16="http://schemas.microsoft.com/office/drawing/2014/main" id="{64FB3CD9-5BD4-4886-B887-2F841B34C58C}"/>
+              </a:ext>
+            </a:extLst>
+          </p:cNvPr>
+          <p:cNvSpPr txBox="1"/>
+          <p:nvPr/>
+        </p:nvSpPr>
+        <p:spPr>
+          <a:xfrm>
+            <a:off x="7821432" y="2869408"/>
+            <a:ext cx="684162" cy="369332"/>
+          </a:xfrm>
+          <a:prstGeom prst="rect">
+            <a:avLst/>
+          </a:prstGeom>
+          <a:noFill/>
+        </p:spPr>
+        <p:txBody>
+          <a:bodyPr wrap="none" rtlCol="0">
+            <a:spAutoFit/>
+          </a:bodyPr>
+          <a:lstStyle/>
+          <a:p>
+            <a:r>
+              <a:rPr lang="it-IT" dirty="0"/>
+              <a:t>Valve</a:t>
+            </a:r>
+          </a:p>
+        </p:txBody>
+      </p:sp>
+      <p:sp>
+        <p:nvSpPr>
+          <p:cNvPr id="42" name="CasellaDiTesto 41">
+            <a:extLst>
+              <a:ext uri="{FF2B5EF4-FFF2-40B4-BE49-F238E27FC236}">
+                <a16:creationId xmlns:a16="http://schemas.microsoft.com/office/drawing/2014/main" id="{D1F7990B-0C65-4DBC-B4BF-4B1F17A257E5}"/>
+              </a:ext>
+            </a:extLst>
+          </p:cNvPr>
+          <p:cNvSpPr txBox="1"/>
+          <p:nvPr/>
+        </p:nvSpPr>
+        <p:spPr>
+          <a:xfrm>
+            <a:off x="4477550" y="605009"/>
+            <a:ext cx="1495922" cy="369332"/>
+          </a:xfrm>
+          <a:prstGeom prst="rect">
+            <a:avLst/>
+          </a:prstGeom>
+          <a:noFill/>
+        </p:spPr>
+        <p:txBody>
+          <a:bodyPr wrap="none" rtlCol="0">
+            <a:spAutoFit/>
+          </a:bodyPr>
+          <a:lstStyle/>
+          <a:p>
+            <a:r>
+              <a:rPr lang="it-IT" dirty="0"/>
+              <a:t>LCD + </a:t>
+            </a:r>
+            <a:r>
+              <a:rPr lang="it-IT" dirty="0" err="1"/>
+              <a:t>Buttons</a:t>
+            </a:r>
+            <a:endParaRPr lang="it-IT" dirty="0"/>
+          </a:p>
+        </p:txBody>
+      </p:sp>
+      <p:sp>
+        <p:nvSpPr>
+          <p:cNvPr id="4" name="Rettangolo 3">
+            <a:extLst>
+              <a:ext uri="{FF2B5EF4-FFF2-40B4-BE49-F238E27FC236}">
+                <a16:creationId xmlns:a16="http://schemas.microsoft.com/office/drawing/2014/main" id="{B3AEB1E9-59ED-4EE0-8F7E-FD270FDA9F37}"/>
+              </a:ext>
+            </a:extLst>
+          </p:cNvPr>
+          <p:cNvSpPr/>
+          <p:nvPr/>
+        </p:nvSpPr>
+        <p:spPr>
+          <a:xfrm>
+            <a:off x="3947511" y="974341"/>
+            <a:ext cx="2556000" cy="864000"/>
+          </a:xfrm>
+          <a:prstGeom prst="rect">
+            <a:avLst/>
+          </a:prstGeom>
+          <a:noFill/>
+        </p:spPr>
+        <p:style>
+          <a:lnRef idx="2">
+            <a:schemeClr val="accent1">
+              <a:shade val="50000"/>
+            </a:schemeClr>
+          </a:lnRef>
+          <a:fillRef idx="1">
+            <a:schemeClr val="accent1"/>
+          </a:fillRef>
+          <a:effectRef idx="0">
+            <a:schemeClr val="accent1"/>
+          </a:effectRef>
+          <a:fontRef idx="minor">
+            <a:schemeClr val="lt1"/>
+          </a:fontRef>
+        </p:style>
+        <p:txBody>
+          <a:bodyPr rtlCol="0" anchor="ctr"/>
+          <a:lstStyle/>
+          <a:p>
+            <a:pPr algn="ctr"/>
+            <a:endParaRPr lang="it-IT"/>
+          </a:p>
+        </p:txBody>
+      </p:sp>
+      <p:grpSp>
+        <p:nvGrpSpPr>
+          <p:cNvPr id="12" name="Gruppo 11">
+            <a:extLst>
+              <a:ext uri="{FF2B5EF4-FFF2-40B4-BE49-F238E27FC236}">
+                <a16:creationId xmlns:a16="http://schemas.microsoft.com/office/drawing/2014/main" id="{0864E02A-7B57-4DD9-9782-6FA13456E69A}"/>
+              </a:ext>
+            </a:extLst>
+          </p:cNvPr>
+          <p:cNvGrpSpPr/>
+          <p:nvPr/>
+        </p:nvGrpSpPr>
+        <p:grpSpPr>
+          <a:xfrm>
+            <a:off x="4185350" y="2305626"/>
+            <a:ext cx="432000" cy="432000"/>
+            <a:chOff x="4966345" y="2077026"/>
+            <a:chExt cx="432000" cy="432000"/>
+          </a:xfrm>
+        </p:grpSpPr>
+        <p:sp>
+          <p:nvSpPr>
+            <p:cNvPr id="6" name="Ovale 5">
+              <a:extLst>
+                <a:ext uri="{FF2B5EF4-FFF2-40B4-BE49-F238E27FC236}">
+                  <a16:creationId xmlns:a16="http://schemas.microsoft.com/office/drawing/2014/main" id="{A90B8217-B8B2-4036-8727-9D013B632737}"/>
+                </a:ext>
+              </a:extLst>
+            </p:cNvPr>
+            <p:cNvSpPr/>
+            <p:nvPr/>
+          </p:nvSpPr>
+          <p:spPr>
+            <a:xfrm>
+              <a:off x="4966345" y="2077026"/>
+              <a:ext cx="432000" cy="432000"/>
+            </a:xfrm>
+            <a:prstGeom prst="ellipse">
+              <a:avLst/>
+            </a:prstGeom>
+            <a:noFill/>
+          </p:spPr>
+          <p:style>
+            <a:lnRef idx="2">
+              <a:schemeClr val="accent1">
+                <a:shade val="50000"/>
+              </a:schemeClr>
+            </a:lnRef>
+            <a:fillRef idx="1">
+              <a:schemeClr val="accent1"/>
+            </a:fillRef>
+            <a:effectRef idx="0">
+              <a:schemeClr val="accent1"/>
+            </a:effectRef>
+            <a:fontRef idx="minor">
+              <a:schemeClr val="lt1"/>
+            </a:fontRef>
+          </p:style>
+          <p:txBody>
+            <a:bodyPr rtlCol="0" anchor="ctr"/>
+            <a:lstStyle/>
+            <a:p>
+              <a:pPr algn="just"/>
+              <a:endParaRPr lang="it-IT"/>
+            </a:p>
+          </p:txBody>
+        </p:sp>
+        <p:cxnSp>
+          <p:nvCxnSpPr>
+            <p:cNvPr id="9" name="Connettore diritto 8">
+              <a:extLst>
+                <a:ext uri="{FF2B5EF4-FFF2-40B4-BE49-F238E27FC236}">
+                  <a16:creationId xmlns:a16="http://schemas.microsoft.com/office/drawing/2014/main" id="{49A53783-0737-4386-98A8-F440A7BA4C86}"/>
+                </a:ext>
+              </a:extLst>
+            </p:cNvPr>
+            <p:cNvCxnSpPr>
+              <a:stCxn id="6" idx="1"/>
+              <a:endCxn id="6" idx="5"/>
+            </p:cNvCxnSpPr>
+            <p:nvPr/>
+          </p:nvCxnSpPr>
+          <p:spPr>
+            <a:xfrm>
+              <a:off x="5029610" y="2140291"/>
+              <a:ext cx="305470" cy="305470"/>
+            </a:xfrm>
+            <a:prstGeom prst="line">
+              <a:avLst/>
+            </a:prstGeom>
+          </p:spPr>
+          <p:style>
+            <a:lnRef idx="1">
+              <a:schemeClr val="accent1"/>
+            </a:lnRef>
+            <a:fillRef idx="0">
+              <a:schemeClr val="accent1"/>
+            </a:fillRef>
+            <a:effectRef idx="0">
+              <a:schemeClr val="accent1"/>
+            </a:effectRef>
+            <a:fontRef idx="minor">
+              <a:schemeClr val="tx1"/>
+            </a:fontRef>
+          </p:style>
+        </p:cxnSp>
+        <p:cxnSp>
+          <p:nvCxnSpPr>
+            <p:cNvPr id="11" name="Connettore diritto 10">
+              <a:extLst>
+                <a:ext uri="{FF2B5EF4-FFF2-40B4-BE49-F238E27FC236}">
+                  <a16:creationId xmlns:a16="http://schemas.microsoft.com/office/drawing/2014/main" id="{097B80E8-E601-4E55-8002-39B560EC3A77}"/>
+                </a:ext>
+              </a:extLst>
+            </p:cNvPr>
+            <p:cNvCxnSpPr>
+              <a:stCxn id="6" idx="3"/>
+              <a:endCxn id="6" idx="7"/>
+            </p:cNvCxnSpPr>
+            <p:nvPr/>
+          </p:nvCxnSpPr>
+          <p:spPr>
+            <a:xfrm flipV="1">
+              <a:off x="5029610" y="2140291"/>
+              <a:ext cx="305470" cy="305470"/>
+            </a:xfrm>
+            <a:prstGeom prst="line">
+              <a:avLst/>
+            </a:prstGeom>
+          </p:spPr>
+          <p:style>
+            <a:lnRef idx="1">
+              <a:schemeClr val="accent1"/>
+            </a:lnRef>
+            <a:fillRef idx="0">
+              <a:schemeClr val="accent1"/>
+            </a:fillRef>
+            <a:effectRef idx="0">
+              <a:schemeClr val="accent1"/>
+            </a:effectRef>
+            <a:fontRef idx="minor">
+              <a:schemeClr val="tx1"/>
+            </a:fontRef>
+          </p:style>
+        </p:cxnSp>
+      </p:grpSp>
+      <p:grpSp>
+        <p:nvGrpSpPr>
+          <p:cNvPr id="43" name="Gruppo 42">
+            <a:extLst>
+              <a:ext uri="{FF2B5EF4-FFF2-40B4-BE49-F238E27FC236}">
+                <a16:creationId xmlns:a16="http://schemas.microsoft.com/office/drawing/2014/main" id="{2CA9AC57-4A8B-4948-8B7B-0C0AD1F94218}"/>
+              </a:ext>
+            </a:extLst>
+          </p:cNvPr>
+          <p:cNvGrpSpPr/>
+          <p:nvPr/>
+        </p:nvGrpSpPr>
+        <p:grpSpPr>
+          <a:xfrm>
+            <a:off x="5009511" y="2309595"/>
+            <a:ext cx="432000" cy="432000"/>
+            <a:chOff x="4966345" y="2077026"/>
+            <a:chExt cx="432000" cy="432000"/>
+          </a:xfrm>
+        </p:grpSpPr>
+        <p:sp>
+          <p:nvSpPr>
+            <p:cNvPr id="44" name="Ovale 43">
+              <a:extLst>
+                <a:ext uri="{FF2B5EF4-FFF2-40B4-BE49-F238E27FC236}">
+                  <a16:creationId xmlns:a16="http://schemas.microsoft.com/office/drawing/2014/main" id="{CFFE27FA-CBDA-4E7B-967B-E856CDA25504}"/>
+                </a:ext>
+              </a:extLst>
+            </p:cNvPr>
+            <p:cNvSpPr/>
+            <p:nvPr/>
+          </p:nvSpPr>
+          <p:spPr>
+            <a:xfrm>
+              <a:off x="4966345" y="2077026"/>
+              <a:ext cx="432000" cy="432000"/>
+            </a:xfrm>
+            <a:prstGeom prst="ellipse">
+              <a:avLst/>
+            </a:prstGeom>
+            <a:noFill/>
+          </p:spPr>
+          <p:style>
+            <a:lnRef idx="2">
+              <a:schemeClr val="accent1">
+                <a:shade val="50000"/>
+              </a:schemeClr>
+            </a:lnRef>
+            <a:fillRef idx="1">
+              <a:schemeClr val="accent1"/>
+            </a:fillRef>
+            <a:effectRef idx="0">
+              <a:schemeClr val="accent1"/>
+            </a:effectRef>
+            <a:fontRef idx="minor">
+              <a:schemeClr val="lt1"/>
+            </a:fontRef>
+          </p:style>
+          <p:txBody>
+            <a:bodyPr rtlCol="0" anchor="ctr"/>
+            <a:lstStyle/>
+            <a:p>
+              <a:pPr algn="ctr"/>
+              <a:endParaRPr lang="it-IT"/>
+            </a:p>
+          </p:txBody>
+        </p:sp>
+        <p:cxnSp>
+          <p:nvCxnSpPr>
+            <p:cNvPr id="45" name="Connettore diritto 44">
+              <a:extLst>
+                <a:ext uri="{FF2B5EF4-FFF2-40B4-BE49-F238E27FC236}">
+                  <a16:creationId xmlns:a16="http://schemas.microsoft.com/office/drawing/2014/main" id="{7F6B7BB0-21FD-4578-9496-51FADF868900}"/>
+                </a:ext>
+              </a:extLst>
+            </p:cNvPr>
+            <p:cNvCxnSpPr>
+              <a:stCxn id="44" idx="1"/>
+              <a:endCxn id="44" idx="5"/>
+            </p:cNvCxnSpPr>
+            <p:nvPr/>
+          </p:nvCxnSpPr>
+          <p:spPr>
+            <a:xfrm>
+              <a:off x="5029610" y="2140291"/>
+              <a:ext cx="305470" cy="305470"/>
+            </a:xfrm>
+            <a:prstGeom prst="line">
+              <a:avLst/>
+            </a:prstGeom>
+          </p:spPr>
+          <p:style>
+            <a:lnRef idx="1">
+              <a:schemeClr val="accent1"/>
+            </a:lnRef>
+            <a:fillRef idx="0">
+              <a:schemeClr val="accent1"/>
+            </a:fillRef>
+            <a:effectRef idx="0">
+              <a:schemeClr val="accent1"/>
+            </a:effectRef>
+            <a:fontRef idx="minor">
+              <a:schemeClr val="tx1"/>
+            </a:fontRef>
+          </p:style>
+        </p:cxnSp>
+        <p:cxnSp>
+          <p:nvCxnSpPr>
+            <p:cNvPr id="46" name="Connettore diritto 45">
+              <a:extLst>
+                <a:ext uri="{FF2B5EF4-FFF2-40B4-BE49-F238E27FC236}">
+                  <a16:creationId xmlns:a16="http://schemas.microsoft.com/office/drawing/2014/main" id="{5BFC926C-0E63-416E-A3E7-C657F7D2945B}"/>
+                </a:ext>
+              </a:extLst>
+            </p:cNvPr>
+            <p:cNvCxnSpPr>
+              <a:stCxn id="44" idx="3"/>
+              <a:endCxn id="44" idx="7"/>
+            </p:cNvCxnSpPr>
+            <p:nvPr/>
+          </p:nvCxnSpPr>
+          <p:spPr>
+            <a:xfrm flipV="1">
+              <a:off x="5029610" y="2140291"/>
+              <a:ext cx="305470" cy="305470"/>
+            </a:xfrm>
+            <a:prstGeom prst="line">
+              <a:avLst/>
+            </a:prstGeom>
+          </p:spPr>
+          <p:style>
+            <a:lnRef idx="1">
+              <a:schemeClr val="accent1"/>
+            </a:lnRef>
+            <a:fillRef idx="0">
+              <a:schemeClr val="accent1"/>
+            </a:fillRef>
+            <a:effectRef idx="0">
+              <a:schemeClr val="accent1"/>
+            </a:effectRef>
+            <a:fontRef idx="minor">
+              <a:schemeClr val="tx1"/>
+            </a:fontRef>
+          </p:style>
+        </p:cxnSp>
+      </p:grpSp>
+      <p:grpSp>
+        <p:nvGrpSpPr>
+          <p:cNvPr id="47" name="Gruppo 46">
+            <a:extLst>
+              <a:ext uri="{FF2B5EF4-FFF2-40B4-BE49-F238E27FC236}">
+                <a16:creationId xmlns:a16="http://schemas.microsoft.com/office/drawing/2014/main" id="{DC357950-836C-471B-A6A3-411BDB73F279}"/>
+              </a:ext>
+            </a:extLst>
+          </p:cNvPr>
+          <p:cNvGrpSpPr/>
+          <p:nvPr/>
+        </p:nvGrpSpPr>
+        <p:grpSpPr>
+          <a:xfrm>
+            <a:off x="5833672" y="2305626"/>
+            <a:ext cx="432000" cy="432000"/>
+            <a:chOff x="4966345" y="2077026"/>
+            <a:chExt cx="432000" cy="432000"/>
+          </a:xfrm>
+        </p:grpSpPr>
+        <p:sp>
+          <p:nvSpPr>
+            <p:cNvPr id="48" name="Ovale 47">
+              <a:extLst>
+                <a:ext uri="{FF2B5EF4-FFF2-40B4-BE49-F238E27FC236}">
+                  <a16:creationId xmlns:a16="http://schemas.microsoft.com/office/drawing/2014/main" id="{A1E14974-6FD1-4F6B-90E4-8542B63312F3}"/>
+                </a:ext>
+              </a:extLst>
+            </p:cNvPr>
+            <p:cNvSpPr/>
+            <p:nvPr/>
+          </p:nvSpPr>
+          <p:spPr>
+            <a:xfrm>
+              <a:off x="4966345" y="2077026"/>
+              <a:ext cx="432000" cy="432000"/>
+            </a:xfrm>
+            <a:prstGeom prst="ellipse">
+              <a:avLst/>
+            </a:prstGeom>
+            <a:noFill/>
+          </p:spPr>
+          <p:style>
+            <a:lnRef idx="2">
+              <a:schemeClr val="accent1">
+                <a:shade val="50000"/>
+              </a:schemeClr>
+            </a:lnRef>
+            <a:fillRef idx="1">
+              <a:schemeClr val="accent1"/>
+            </a:fillRef>
+            <a:effectRef idx="0">
+              <a:schemeClr val="accent1"/>
+            </a:effectRef>
+            <a:fontRef idx="minor">
+              <a:schemeClr val="lt1"/>
+            </a:fontRef>
+          </p:style>
+          <p:txBody>
+            <a:bodyPr rtlCol="0" anchor="ctr"/>
+            <a:lstStyle/>
+            <a:p>
+              <a:pPr algn="ctr"/>
+              <a:endParaRPr lang="it-IT"/>
+            </a:p>
+          </p:txBody>
+        </p:sp>
+        <p:cxnSp>
+          <p:nvCxnSpPr>
+            <p:cNvPr id="49" name="Connettore diritto 48">
+              <a:extLst>
+                <a:ext uri="{FF2B5EF4-FFF2-40B4-BE49-F238E27FC236}">
+                  <a16:creationId xmlns:a16="http://schemas.microsoft.com/office/drawing/2014/main" id="{33CED016-4FD7-42E2-BB3B-8E35E6A4D6ED}"/>
+                </a:ext>
+              </a:extLst>
+            </p:cNvPr>
+            <p:cNvCxnSpPr>
+              <a:stCxn id="48" idx="1"/>
+              <a:endCxn id="48" idx="5"/>
+            </p:cNvCxnSpPr>
+            <p:nvPr/>
+          </p:nvCxnSpPr>
+          <p:spPr>
+            <a:xfrm>
+              <a:off x="5029610" y="2140291"/>
+              <a:ext cx="305470" cy="305470"/>
+            </a:xfrm>
+            <a:prstGeom prst="line">
+              <a:avLst/>
+            </a:prstGeom>
+          </p:spPr>
+          <p:style>
+            <a:lnRef idx="1">
+              <a:schemeClr val="accent1"/>
+            </a:lnRef>
+            <a:fillRef idx="0">
+              <a:schemeClr val="accent1"/>
+            </a:fillRef>
+            <a:effectRef idx="0">
+              <a:schemeClr val="accent1"/>
+            </a:effectRef>
+            <a:fontRef idx="minor">
+              <a:schemeClr val="tx1"/>
+            </a:fontRef>
+          </p:style>
+        </p:cxnSp>
+        <p:cxnSp>
+          <p:nvCxnSpPr>
+            <p:cNvPr id="50" name="Connettore diritto 49">
+              <a:extLst>
+                <a:ext uri="{FF2B5EF4-FFF2-40B4-BE49-F238E27FC236}">
+                  <a16:creationId xmlns:a16="http://schemas.microsoft.com/office/drawing/2014/main" id="{D9947C96-393D-4626-8DA4-651CC2F445C9}"/>
+                </a:ext>
+              </a:extLst>
+            </p:cNvPr>
+            <p:cNvCxnSpPr>
+              <a:stCxn id="48" idx="3"/>
+              <a:endCxn id="48" idx="7"/>
+            </p:cNvCxnSpPr>
+            <p:nvPr/>
+          </p:nvCxnSpPr>
+          <p:spPr>
+            <a:xfrm flipV="1">
+              <a:off x="5029610" y="2140291"/>
+              <a:ext cx="305470" cy="305470"/>
+            </a:xfrm>
+            <a:prstGeom prst="line">
+              <a:avLst/>
+            </a:prstGeom>
+          </p:spPr>
+          <p:style>
+            <a:lnRef idx="1">
+              <a:schemeClr val="accent1"/>
+            </a:lnRef>
+            <a:fillRef idx="0">
+              <a:schemeClr val="accent1"/>
+            </a:fillRef>
+            <a:effectRef idx="0">
+              <a:schemeClr val="accent1"/>
+            </a:effectRef>
+            <a:fontRef idx="minor">
+              <a:schemeClr val="tx1"/>
+            </a:fontRef>
+          </p:style>
+        </p:cxnSp>
+      </p:grpSp>
     </p:spTree>
     <p:extLst>
       <p:ext uri="{BB962C8B-B14F-4D97-AF65-F5344CB8AC3E}">

</xml_diff>